<commit_message>
Inserir os Casos de Uso Real do Proxy
</commit_message>
<xml_diff>
--- a/Padrões de Projeto - Proxy.pptx
+++ b/Padrões de Projeto - Proxy.pptx
@@ -11,6 +11,7 @@
     <p:sldId id="261" r:id="rId5"/>
     <p:sldId id="263" r:id="rId6"/>
     <p:sldId id="265" r:id="rId7"/>
+    <p:sldId id="267" r:id="rId8"/>
   </p:sldIdLst>
   <p:sldSz cx="12192000" cy="6858000"/>
   <p:notesSz cx="6858000" cy="9144000"/>
@@ -264,7 +265,7 @@
           <a:p>
             <a:fld id="{E89E2D43-4E13-4C6B-816F-DC0749EFB127}" type="datetimeFigureOut">
               <a:rPr lang="pt-BR" smtClean="0"/>
-              <a:t>16/04/2023</a:t>
+              <a:t>19/04/2023</a:t>
             </a:fld>
             <a:endParaRPr lang="pt-BR"/>
           </a:p>
@@ -462,7 +463,7 @@
           <a:p>
             <a:fld id="{E89E2D43-4E13-4C6B-816F-DC0749EFB127}" type="datetimeFigureOut">
               <a:rPr lang="pt-BR" smtClean="0"/>
-              <a:t>16/04/2023</a:t>
+              <a:t>19/04/2023</a:t>
             </a:fld>
             <a:endParaRPr lang="pt-BR"/>
           </a:p>
@@ -670,7 +671,7 @@
           <a:p>
             <a:fld id="{E89E2D43-4E13-4C6B-816F-DC0749EFB127}" type="datetimeFigureOut">
               <a:rPr lang="pt-BR" smtClean="0"/>
-              <a:t>16/04/2023</a:t>
+              <a:t>19/04/2023</a:t>
             </a:fld>
             <a:endParaRPr lang="pt-BR"/>
           </a:p>
@@ -868,7 +869,7 @@
           <a:p>
             <a:fld id="{E89E2D43-4E13-4C6B-816F-DC0749EFB127}" type="datetimeFigureOut">
               <a:rPr lang="pt-BR" smtClean="0"/>
-              <a:t>16/04/2023</a:t>
+              <a:t>19/04/2023</a:t>
             </a:fld>
             <a:endParaRPr lang="pt-BR"/>
           </a:p>
@@ -1143,7 +1144,7 @@
           <a:p>
             <a:fld id="{E89E2D43-4E13-4C6B-816F-DC0749EFB127}" type="datetimeFigureOut">
               <a:rPr lang="pt-BR" smtClean="0"/>
-              <a:t>16/04/2023</a:t>
+              <a:t>19/04/2023</a:t>
             </a:fld>
             <a:endParaRPr lang="pt-BR"/>
           </a:p>
@@ -1408,7 +1409,7 @@
           <a:p>
             <a:fld id="{E89E2D43-4E13-4C6B-816F-DC0749EFB127}" type="datetimeFigureOut">
               <a:rPr lang="pt-BR" smtClean="0"/>
-              <a:t>16/04/2023</a:t>
+              <a:t>19/04/2023</a:t>
             </a:fld>
             <a:endParaRPr lang="pt-BR"/>
           </a:p>
@@ -1820,7 +1821,7 @@
           <a:p>
             <a:fld id="{E89E2D43-4E13-4C6B-816F-DC0749EFB127}" type="datetimeFigureOut">
               <a:rPr lang="pt-BR" smtClean="0"/>
-              <a:t>16/04/2023</a:t>
+              <a:t>19/04/2023</a:t>
             </a:fld>
             <a:endParaRPr lang="pt-BR"/>
           </a:p>
@@ -1961,7 +1962,7 @@
           <a:p>
             <a:fld id="{E89E2D43-4E13-4C6B-816F-DC0749EFB127}" type="datetimeFigureOut">
               <a:rPr lang="pt-BR" smtClean="0"/>
-              <a:t>16/04/2023</a:t>
+              <a:t>19/04/2023</a:t>
             </a:fld>
             <a:endParaRPr lang="pt-BR"/>
           </a:p>
@@ -2074,7 +2075,7 @@
           <a:p>
             <a:fld id="{E89E2D43-4E13-4C6B-816F-DC0749EFB127}" type="datetimeFigureOut">
               <a:rPr lang="pt-BR" smtClean="0"/>
-              <a:t>16/04/2023</a:t>
+              <a:t>19/04/2023</a:t>
             </a:fld>
             <a:endParaRPr lang="pt-BR"/>
           </a:p>
@@ -2385,7 +2386,7 @@
           <a:p>
             <a:fld id="{E89E2D43-4E13-4C6B-816F-DC0749EFB127}" type="datetimeFigureOut">
               <a:rPr lang="pt-BR" smtClean="0"/>
-              <a:t>16/04/2023</a:t>
+              <a:t>19/04/2023</a:t>
             </a:fld>
             <a:endParaRPr lang="pt-BR"/>
           </a:p>
@@ -2673,7 +2674,7 @@
           <a:p>
             <a:fld id="{E89E2D43-4E13-4C6B-816F-DC0749EFB127}" type="datetimeFigureOut">
               <a:rPr lang="pt-BR" smtClean="0"/>
-              <a:t>16/04/2023</a:t>
+              <a:t>19/04/2023</a:t>
             </a:fld>
             <a:endParaRPr lang="pt-BR"/>
           </a:p>
@@ -2914,7 +2915,7 @@
           <a:p>
             <a:fld id="{E89E2D43-4E13-4C6B-816F-DC0749EFB127}" type="datetimeFigureOut">
               <a:rPr lang="pt-BR" smtClean="0"/>
-              <a:t>16/04/2023</a:t>
+              <a:t>19/04/2023</a:t>
             </a:fld>
             <a:endParaRPr lang="pt-BR"/>
           </a:p>
@@ -4292,6 +4293,137 @@
 </p:sld>
 </file>
 
+<file path=ppt/slides/slide7.xml><?xml version="1.0" encoding="utf-8"?>
+<p:sld xmlns:a="http://schemas.openxmlformats.org/drawingml/2006/main" xmlns:r="http://schemas.openxmlformats.org/officeDocument/2006/relationships" xmlns:p="http://schemas.openxmlformats.org/presentationml/2006/main">
+  <p:cSld>
+    <p:spTree>
+      <p:nvGrpSpPr>
+        <p:cNvPr id="1" name=""/>
+        <p:cNvGrpSpPr/>
+        <p:nvPr/>
+      </p:nvGrpSpPr>
+      <p:grpSpPr>
+        <a:xfrm>
+          <a:off x="0" y="0"/>
+          <a:ext cx="0" cy="0"/>
+          <a:chOff x="0" y="0"/>
+          <a:chExt cx="0" cy="0"/>
+        </a:xfrm>
+      </p:grpSpPr>
+      <p:sp>
+        <p:nvSpPr>
+          <p:cNvPr id="2" name="Título 1">
+            <a:extLst>
+              <a:ext uri="{FF2B5EF4-FFF2-40B4-BE49-F238E27FC236}">
+                <a16:creationId xmlns:a16="http://schemas.microsoft.com/office/drawing/2014/main" id="{4EACB81C-0AA4-143B-46B2-4FC818BF7D4D}"/>
+              </a:ext>
+            </a:extLst>
+          </p:cNvPr>
+          <p:cNvSpPr>
+            <a:spLocks noGrp="1"/>
+          </p:cNvSpPr>
+          <p:nvPr>
+            <p:ph type="title"/>
+          </p:nvPr>
+        </p:nvSpPr>
+        <p:spPr/>
+        <p:txBody>
+          <a:bodyPr/>
+          <a:lstStyle/>
+          <a:p>
+            <a:r>
+              <a:rPr lang="pt-BR" dirty="0">
+                <a:effectLst/>
+                <a:latin typeface="Arial" panose="020B0604020202020204" pitchFamily="34" charset="0"/>
+              </a:rPr>
+              <a:t>Proxy – Situações Reais de Uso</a:t>
+            </a:r>
+            <a:endParaRPr lang="pt-BR" dirty="0"/>
+          </a:p>
+        </p:txBody>
+      </p:sp>
+      <p:sp>
+        <p:nvSpPr>
+          <p:cNvPr id="3" name="Espaço Reservado para Conteúdo 2">
+            <a:extLst>
+              <a:ext uri="{FF2B5EF4-FFF2-40B4-BE49-F238E27FC236}">
+                <a16:creationId xmlns:a16="http://schemas.microsoft.com/office/drawing/2014/main" id="{AE52C1F7-53C5-1478-514E-B87BC168A70B}"/>
+              </a:ext>
+            </a:extLst>
+          </p:cNvPr>
+          <p:cNvSpPr>
+            <a:spLocks noGrp="1"/>
+          </p:cNvSpPr>
+          <p:nvPr>
+            <p:ph idx="1"/>
+          </p:nvPr>
+        </p:nvSpPr>
+        <p:spPr/>
+        <p:txBody>
+          <a:bodyPr>
+            <a:normAutofit fontScale="70000" lnSpcReduction="20000"/>
+          </a:bodyPr>
+          <a:lstStyle/>
+          <a:p>
+            <a:r>
+              <a:rPr lang="pt-BR" dirty="0"/>
+              <a:t>Netflix: Usa o padrão Proxy para os servidores armazenarem o Cache com os conteúdos mais populares de certas regiões permitindo transmitir rapidamente com menos interrupções;</a:t>
+            </a:r>
+          </a:p>
+          <a:p>
+            <a:endParaRPr lang="pt-BR" dirty="0"/>
+          </a:p>
+          <a:p>
+            <a:r>
+              <a:rPr lang="pt-BR" dirty="0"/>
+              <a:t>Google Drive: Usa o padrão Proxy para armazenarem o Cache com os arquivos abertamente compartilhados que são frequentemente acessados pelos usuários, diminuindo o tempo de transferência de arquivos na rede;</a:t>
+            </a:r>
+          </a:p>
+          <a:p>
+            <a:endParaRPr lang="pt-BR" dirty="0"/>
+          </a:p>
+          <a:p>
+            <a:r>
+              <a:rPr lang="pt-BR" dirty="0"/>
+              <a:t>Dropbox: Usa o padrão Proxy para proteger a privacidade do usuários, mascarando o IP real do usuário, protegendo não só a privacidade como também a segurança no armazenamento dos dados.</a:t>
+            </a:r>
+          </a:p>
+          <a:p>
+            <a:endParaRPr lang="pt-BR" dirty="0"/>
+          </a:p>
+          <a:p>
+            <a:r>
+              <a:rPr lang="pt-BR" dirty="0" err="1"/>
+              <a:t>Squid</a:t>
+            </a:r>
+            <a:r>
+              <a:rPr lang="pt-BR" dirty="0"/>
+              <a:t> Proxy: Usa o padrão Proxy no seu aplicativo </a:t>
+            </a:r>
+            <a:r>
+              <a:rPr lang="pt-BR" dirty="0" err="1"/>
+              <a:t>Squid</a:t>
+            </a:r>
+            <a:r>
+              <a:rPr lang="pt-BR" dirty="0"/>
+              <a:t> Proxy com o intuito de melhorar o desempenho da rede dos seus usuários, fazendo o acesso a sites mais rápidos e eficientes.</a:t>
+            </a:r>
+          </a:p>
+        </p:txBody>
+      </p:sp>
+    </p:spTree>
+    <p:extLst>
+      <p:ext uri="{BB962C8B-B14F-4D97-AF65-F5344CB8AC3E}">
+        <p14:creationId xmlns:p14="http://schemas.microsoft.com/office/powerpoint/2010/main" val="1557363423"/>
+      </p:ext>
+    </p:extLst>
+  </p:cSld>
+  <p:clrMapOvr>
+    <a:masterClrMapping/>
+  </p:clrMapOvr>
+</p:sld>
+</file>
+
 <file path=ppt/theme/theme1.xml><?xml version="1.0" encoding="utf-8"?>
 <a:theme xmlns:a="http://schemas.openxmlformats.org/drawingml/2006/main" name="Tema do Office">
   <a:themeElements>

</xml_diff>